<commit_message>
added august meetup documents
</commit_message>
<xml_diff>
--- a/presentations/aug-2018/aug-2018.pptx
+++ b/presentations/aug-2018/aug-2018.pptx
@@ -4418,8 +4418,8 @@
         </p:nvSpPr>
         <p:spPr>
           <a:xfrm>
-            <a:off x="952500" y="3797300"/>
-            <a:ext cx="11099800" cy="2159000"/>
+            <a:off x="952499" y="2943329"/>
+            <a:ext cx="11099801" cy="2159001"/>
           </a:xfrm>
           <a:prstGeom prst="rect">
             <a:avLst/>
@@ -4465,6 +4465,51 @@
           </a:ln>
         </p:spPr>
       </p:pic>
+      <p:sp>
+        <p:nvSpPr>
+          <p:cNvPr id="203" name="https://stackblitz.com/github/ngHighCountry/superhero-app/tree/noChildren"/>
+          <p:cNvSpPr txBox="1"/>
+          <p:nvPr/>
+        </p:nvSpPr>
+        <p:spPr>
+          <a:xfrm>
+            <a:off x="952500" y="4651270"/>
+            <a:ext cx="11099801" cy="2159001"/>
+          </a:xfrm>
+          <a:prstGeom prst="rect">
+            <a:avLst/>
+          </a:prstGeom>
+          <a:ln w="12700">
+            <a:miter lim="400000"/>
+          </a:ln>
+          <a:extLst>
+            <a:ext uri="{C572A759-6A51-4108-AA02-DFA0A04FC94B}">
+              <ma14:wrappingTextBoxFlag xmlns:ma14="http://schemas.microsoft.com/office/mac/drawingml/2011/main" val="1"/>
+            </a:ext>
+          </a:extLst>
+        </p:spPr>
+        <p:txBody>
+          <a:bodyPr lIns="50800" tIns="50800" rIns="50800" bIns="50800" anchor="ctr">
+            <a:normAutofit fontScale="100000" lnSpcReduction="0"/>
+          </a:bodyPr>
+          <a:lstStyle>
+            <a:lvl1pPr>
+              <a:defRPr b="0" sz="3500">
+                <a:latin typeface="+mn-lt"/>
+                <a:ea typeface="+mn-ea"/>
+                <a:cs typeface="+mn-cs"/>
+                <a:sym typeface="Helvetica Neue Medium"/>
+              </a:defRPr>
+            </a:lvl1pPr>
+          </a:lstStyle>
+          <a:p>
+            <a:pPr/>
+            <a:r>
+              <a:t>https://stackblitz.com/github/ngHighCountry/superhero-app/tree/noChildren</a:t>
+            </a:r>
+          </a:p>
+        </p:txBody>
+      </p:sp>
     </p:spTree>
   </p:cSld>
   <p:clrMapOvr>

</xml_diff>